<commit_message>
snowflakes added and presentation updated
</commit_message>
<xml_diff>
--- a/Documentation/Presentation.pptx
+++ b/Documentation/Presentation.pptx
@@ -10,16 +10,18 @@
     <p:sldMasterId id="2147483697" r:id="rId6"/>
   </p:sldMasterIdLst>
   <p:notesMasterIdLst>
-    <p:notesMasterId r:id="rId11"/>
+    <p:notesMasterId r:id="rId13"/>
   </p:notesMasterIdLst>
   <p:handoutMasterIdLst>
-    <p:handoutMasterId r:id="rId12"/>
+    <p:handoutMasterId r:id="rId14"/>
   </p:handoutMasterIdLst>
   <p:sldIdLst>
     <p:sldId id="355" r:id="rId7"/>
     <p:sldId id="397" r:id="rId8"/>
     <p:sldId id="398" r:id="rId9"/>
     <p:sldId id="399" r:id="rId10"/>
+    <p:sldId id="400" r:id="rId11"/>
+    <p:sldId id="401" r:id="rId12"/>
   </p:sldIdLst>
   <p:sldSz cx="9144000" cy="6858000" type="screen4x3"/>
   <p:notesSz cx="9925050" cy="6665913"/>
@@ -290,7 +292,7 @@
               <a:pPr>
                 <a:defRPr/>
               </a:pPr>
-              <a:t>06/02/2019</a:t>
+              <a:t>07/02/2019</a:t>
             </a:fld>
             <a:endParaRPr lang="en-GB" dirty="0"/>
           </a:p>
@@ -509,7 +511,7 @@
               <a:pPr>
                 <a:defRPr/>
               </a:pPr>
-              <a:t>06/02/2019</a:t>
+              <a:t>07/02/2019</a:t>
             </a:fld>
             <a:endParaRPr lang="en-GB"/>
           </a:p>
@@ -1186,255 +1188,6 @@
 
 <file path=ppt/slideLayouts/slideLayout10.xml><?xml version="1.0" encoding="utf-8"?>
 <p:sldLayout xmlns:a="http://schemas.openxmlformats.org/drawingml/2006/main" xmlns:r="http://schemas.openxmlformats.org/officeDocument/2006/relationships" xmlns:p="http://schemas.openxmlformats.org/presentationml/2006/main" preserve="1" userDrawn="1">
-  <p:cSld name="Start">
-    <p:spTree>
-      <p:nvGrpSpPr>
-        <p:cNvPr id="1" name=""/>
-        <p:cNvGrpSpPr/>
-        <p:nvPr/>
-      </p:nvGrpSpPr>
-      <p:grpSpPr>
-        <a:xfrm>
-          <a:off x="0" y="0"/>
-          <a:ext cx="0" cy="0"/>
-          <a:chOff x="0" y="0"/>
-          <a:chExt cx="0" cy="0"/>
-        </a:xfrm>
-      </p:grpSpPr>
-      <p:sp>
-        <p:nvSpPr>
-          <p:cNvPr id="16" name="Inhaltsplatzhalter 2"/>
-          <p:cNvSpPr>
-            <a:spLocks noGrp="1"/>
-          </p:cNvSpPr>
-          <p:nvPr>
-            <p:ph idx="10" hasCustomPrompt="1"/>
-          </p:nvPr>
-        </p:nvSpPr>
-        <p:spPr>
-          <a:xfrm>
-            <a:off x="319088" y="1978720"/>
-            <a:ext cx="8508999" cy="1274125"/>
-          </a:xfrm>
-          <a:prstGeom prst="rect">
-            <a:avLst/>
-          </a:prstGeom>
-          <a:noFill/>
-          <a:ln w="9525">
-            <a:noFill/>
-            <a:miter lim="800000"/>
-            <a:headEnd/>
-            <a:tailEnd/>
-          </a:ln>
-        </p:spPr>
-        <p:txBody>
-          <a:bodyPr vert="horz" wrap="square" lIns="0" tIns="0" rIns="0" bIns="0" numCol="1" anchor="t" anchorCtr="0" compatLnSpc="1">
-            <a:prstTxWarp prst="textNoShape">
-              <a:avLst/>
-            </a:prstTxWarp>
-          </a:bodyPr>
-          <a:lstStyle>
-            <a:lvl1pPr>
-              <a:lnSpc>
-                <a:spcPct val="150000"/>
-              </a:lnSpc>
-              <a:defRPr lang="de-DE" sz="1600" baseline="0" noProof="0" dirty="0" smtClean="0"/>
-            </a:lvl1pPr>
-            <a:lvl2pPr>
-              <a:defRPr lang="de-DE" noProof="0" dirty="0" smtClean="0"/>
-            </a:lvl2pPr>
-          </a:lstStyle>
-          <a:p>
-            <a:pPr lvl="0"/>
-            <a:r>
-              <a:rPr lang="de-DE" noProof="0" dirty="0"/>
-              <a:t>Referent</a:t>
-            </a:r>
-            <a:br>
-              <a:rPr lang="de-DE" noProof="0" dirty="0"/>
-            </a:br>
-            <a:r>
-              <a:rPr lang="de-DE" noProof="0" dirty="0"/>
-              <a:t>Ort, Datum (Schreibweise: 00. Januar 2015)</a:t>
-            </a:r>
-          </a:p>
-        </p:txBody>
-      </p:sp>
-      <p:sp>
-        <p:nvSpPr>
-          <p:cNvPr id="14" name="Rechteck 13"/>
-          <p:cNvSpPr/>
-          <p:nvPr userDrawn="1"/>
-        </p:nvSpPr>
-        <p:spPr bwMode="auto">
-          <a:xfrm>
-            <a:off x="8347635" y="6408271"/>
-            <a:ext cx="575236" cy="358588"/>
-          </a:xfrm>
-          <a:prstGeom prst="rect">
-            <a:avLst/>
-          </a:prstGeom>
-          <a:solidFill>
-            <a:schemeClr val="bg1"/>
-          </a:solidFill>
-          <a:ln w="9525" cap="flat" cmpd="sng" algn="ctr">
-            <a:noFill/>
-            <a:prstDash val="solid"/>
-            <a:round/>
-            <a:headEnd type="none" w="med" len="med"/>
-            <a:tailEnd type="none" w="med" len="med"/>
-          </a:ln>
-          <a:effectLst/>
-        </p:spPr>
-        <p:txBody>
-          <a:bodyPr vert="horz" wrap="square" lIns="91440" tIns="45720" rIns="91440" bIns="45720" numCol="1" rtlCol="0" anchor="t" anchorCtr="0" compatLnSpc="1">
-            <a:prstTxWarp prst="textNoShape">
-              <a:avLst/>
-            </a:prstTxWarp>
-          </a:bodyPr>
-          <a:lstStyle/>
-          <a:p>
-            <a:pPr marL="0" marR="0" indent="0" algn="r" defTabSz="914400" rtl="0" eaLnBrk="0" fontAlgn="base" latinLnBrk="0" hangingPunct="0">
-              <a:lnSpc>
-                <a:spcPct val="100000"/>
-              </a:lnSpc>
-              <a:spcBef>
-                <a:spcPct val="0"/>
-              </a:spcBef>
-              <a:spcAft>
-                <a:spcPct val="0"/>
-              </a:spcAft>
-              <a:buClrTx/>
-              <a:buSzTx/>
-              <a:buFontTx/>
-              <a:buNone/>
-              <a:tabLst/>
-            </a:pPr>
-            <a:endParaRPr kumimoji="0" lang="de-DE" sz="2000" b="0" i="0" u="none" strike="noStrike" cap="none" normalizeH="0" baseline="0">
-              <a:ln>
-                <a:noFill/>
-              </a:ln>
-              <a:solidFill>
-                <a:schemeClr val="tx1"/>
-              </a:solidFill>
-              <a:effectLst/>
-              <a:latin typeface="Arial" pitchFamily="34" charset="0"/>
-            </a:endParaRPr>
-          </a:p>
-        </p:txBody>
-      </p:sp>
-      <p:sp>
-        <p:nvSpPr>
-          <p:cNvPr id="8" name="Foliennummernplatzhalter 7"/>
-          <p:cNvSpPr>
-            <a:spLocks noGrp="1"/>
-          </p:cNvSpPr>
-          <p:nvPr>
-            <p:ph type="sldNum" sz="quarter" idx="12"/>
-          </p:nvPr>
-        </p:nvSpPr>
-        <p:spPr/>
-        <p:txBody>
-          <a:bodyPr/>
-          <a:lstStyle/>
-          <a:p>
-            <a:fld id="{CE58CB1E-F828-4F11-99E0-327109AF9DA4}" type="slidenum">
-              <a:rPr lang="de-DE" smtClean="0"/>
-              <a:pPr/>
-              <a:t>‹Nr.›</a:t>
-            </a:fld>
-            <a:endParaRPr lang="de-DE" dirty="0"/>
-          </a:p>
-        </p:txBody>
-      </p:sp>
-      <p:sp>
-        <p:nvSpPr>
-          <p:cNvPr id="10" name="Fußzeilenplatzhalter 9"/>
-          <p:cNvSpPr>
-            <a:spLocks noGrp="1"/>
-          </p:cNvSpPr>
-          <p:nvPr>
-            <p:ph type="ftr" sz="quarter" idx="13"/>
-          </p:nvPr>
-        </p:nvSpPr>
-        <p:spPr/>
-        <p:txBody>
-          <a:bodyPr/>
-          <a:lstStyle/>
-          <a:p>
-            <a:r>
-              <a:rPr lang="de-DE"/>
-              <a:t>Dr. rer. nat. Erika Mustermann (TUM) | kann beliebig erweitert werden | Infos mit Strich trennen</a:t>
-            </a:r>
-            <a:endParaRPr lang="en-US" dirty="0"/>
-          </a:p>
-        </p:txBody>
-      </p:sp>
-      <p:sp>
-        <p:nvSpPr>
-          <p:cNvPr id="7" name="Titel 1"/>
-          <p:cNvSpPr>
-            <a:spLocks noGrp="1"/>
-          </p:cNvSpPr>
-          <p:nvPr>
-            <p:ph type="title" hasCustomPrompt="1"/>
-          </p:nvPr>
-        </p:nvSpPr>
-        <p:spPr>
-          <a:xfrm>
-            <a:off x="319090" y="994334"/>
-            <a:ext cx="8508999" cy="410369"/>
-          </a:xfrm>
-          <a:prstGeom prst="rect">
-            <a:avLst/>
-          </a:prstGeom>
-          <a:noFill/>
-          <a:ln w="9525">
-            <a:noFill/>
-            <a:miter lim="800000"/>
-            <a:headEnd/>
-            <a:tailEnd/>
-          </a:ln>
-        </p:spPr>
-        <p:txBody>
-          <a:bodyPr vert="horz" wrap="square" lIns="0" tIns="0" rIns="0" bIns="0" numCol="1" anchor="t" anchorCtr="0" compatLnSpc="1">
-            <a:prstTxWarp prst="textNoShape">
-              <a:avLst/>
-            </a:prstTxWarp>
-            <a:spAutoFit/>
-          </a:bodyPr>
-          <a:lstStyle>
-            <a:lvl1pPr>
-              <a:lnSpc>
-                <a:spcPts val="3200"/>
-              </a:lnSpc>
-              <a:defRPr lang="de-DE" sz="3000" noProof="0" dirty="0"/>
-            </a:lvl1pPr>
-          </a:lstStyle>
-          <a:p>
-            <a:pPr lvl="0"/>
-            <a:r>
-              <a:rPr lang="de-DE" noProof="0" dirty="0"/>
-              <a:t>Titel durch Klicken bearbeiten</a:t>
-            </a:r>
-          </a:p>
-        </p:txBody>
-      </p:sp>
-    </p:spTree>
-    <p:extLst>
-      <p:ext uri="{BB962C8B-B14F-4D97-AF65-F5344CB8AC3E}">
-        <p14:creationId xmlns:p14="http://schemas.microsoft.com/office/powerpoint/2010/main" val="171855092"/>
-      </p:ext>
-    </p:extLst>
-  </p:cSld>
-  <p:clrMapOvr>
-    <a:masterClrMapping/>
-  </p:clrMapOvr>
-</p:sldLayout>
-</file>
-
-<file path=ppt/slideLayouts/slideLayout11.xml><?xml version="1.0" encoding="utf-8"?>
-<p:sldLayout xmlns:a="http://schemas.openxmlformats.org/drawingml/2006/main" xmlns:r="http://schemas.openxmlformats.org/officeDocument/2006/relationships" xmlns:p="http://schemas.openxmlformats.org/presentationml/2006/main" preserve="1" userDrawn="1">
   <p:cSld name="Inhalt">
     <p:spTree>
       <p:nvGrpSpPr>
@@ -1632,7 +1385,7 @@
 </p:sldLayout>
 </file>
 
-<file path=ppt/slideLayouts/slideLayout12.xml><?xml version="1.0" encoding="utf-8"?>
+<file path=ppt/slideLayouts/slideLayout11.xml><?xml version="1.0" encoding="utf-8"?>
 <p:sldLayout xmlns:a="http://schemas.openxmlformats.org/drawingml/2006/main" xmlns:r="http://schemas.openxmlformats.org/officeDocument/2006/relationships" xmlns:p="http://schemas.openxmlformats.org/presentationml/2006/main" preserve="1" userDrawn="1">
   <p:cSld name="Inhalt + Text">
     <p:spTree>
@@ -1879,7 +1632,7 @@
 </p:sldLayout>
 </file>
 
-<file path=ppt/slideLayouts/slideLayout13.xml><?xml version="1.0" encoding="utf-8"?>
+<file path=ppt/slideLayouts/slideLayout12.xml><?xml version="1.0" encoding="utf-8"?>
 <p:sldLayout xmlns:a="http://schemas.openxmlformats.org/drawingml/2006/main" xmlns:r="http://schemas.openxmlformats.org/officeDocument/2006/relationships" xmlns:p="http://schemas.openxmlformats.org/presentationml/2006/main" preserve="1" userDrawn="1">
   <p:cSld name="zwei Inhalte">
     <p:spTree>
@@ -2152,7 +1905,7 @@
 </p:sldLayout>
 </file>
 
-<file path=ppt/slideLayouts/slideLayout14.xml><?xml version="1.0" encoding="utf-8"?>
+<file path=ppt/slideLayouts/slideLayout13.xml><?xml version="1.0" encoding="utf-8"?>
 <p:sldLayout xmlns:a="http://schemas.openxmlformats.org/drawingml/2006/main" xmlns:r="http://schemas.openxmlformats.org/officeDocument/2006/relationships" xmlns:p="http://schemas.openxmlformats.org/presentationml/2006/main" preserve="1" userDrawn="1">
   <p:cSld name="Zwei Inhalte + Text">
     <p:spTree>
@@ -2424,7 +2177,7 @@
 </p:sldLayout>
 </file>
 
-<file path=ppt/slideLayouts/slideLayout15.xml><?xml version="1.0" encoding="utf-8"?>
+<file path=ppt/slideLayouts/slideLayout14.xml><?xml version="1.0" encoding="utf-8"?>
 <p:sldLayout xmlns:a="http://schemas.openxmlformats.org/drawingml/2006/main" xmlns:r="http://schemas.openxmlformats.org/officeDocument/2006/relationships" xmlns:p="http://schemas.openxmlformats.org/presentationml/2006/main" preserve="1" userDrawn="1">
   <p:cSld name="Zwei Inhalte + Text (Hintergrund)">
     <p:spTree>
@@ -2739,7 +2492,7 @@
 </p:sldLayout>
 </file>
 
-<file path=ppt/slideLayouts/slideLayout16.xml><?xml version="1.0" encoding="utf-8"?>
+<file path=ppt/slideLayouts/slideLayout15.xml><?xml version="1.0" encoding="utf-8"?>
 <p:sldLayout xmlns:a="http://schemas.openxmlformats.org/drawingml/2006/main" xmlns:r="http://schemas.openxmlformats.org/officeDocument/2006/relationships" xmlns:p="http://schemas.openxmlformats.org/presentationml/2006/main" preserve="1" userDrawn="1">
   <p:cSld name="große Bilder">
     <p:spTree>
@@ -2941,7 +2694,7 @@
 </p:sldLayout>
 </file>
 
-<file path=ppt/slideLayouts/slideLayout17.xml><?xml version="1.0" encoding="utf-8"?>
+<file path=ppt/slideLayouts/slideLayout16.xml><?xml version="1.0" encoding="utf-8"?>
 <p:sldLayout xmlns:a="http://schemas.openxmlformats.org/drawingml/2006/main" xmlns:r="http://schemas.openxmlformats.org/officeDocument/2006/relationships" xmlns:p="http://schemas.openxmlformats.org/presentationml/2006/main" preserve="1" userDrawn="1">
   <p:cSld name="Bilder formatfüllend">
     <p:spTree>
@@ -3102,7 +2855,7 @@
 </p:sldLayout>
 </file>
 
-<file path=ppt/slideLayouts/slideLayout18.xml><?xml version="1.0" encoding="utf-8"?>
+<file path=ppt/slideLayouts/slideLayout17.xml><?xml version="1.0" encoding="utf-8"?>
 <p:sldLayout xmlns:a="http://schemas.openxmlformats.org/drawingml/2006/main" xmlns:r="http://schemas.openxmlformats.org/officeDocument/2006/relationships" xmlns:p="http://schemas.openxmlformats.org/presentationml/2006/main" preserve="1" userDrawn="1">
   <p:cSld name="Kapiteltrenner">
     <p:spTree>
@@ -3251,7 +3004,7 @@
 </p:sldLayout>
 </file>
 
-<file path=ppt/slideLayouts/slideLayout19.xml><?xml version="1.0" encoding="utf-8"?>
+<file path=ppt/slideLayouts/slideLayout18.xml><?xml version="1.0" encoding="utf-8"?>
 <p:sldLayout xmlns:a="http://schemas.openxmlformats.org/drawingml/2006/main" xmlns:r="http://schemas.openxmlformats.org/officeDocument/2006/relationships" xmlns:p="http://schemas.openxmlformats.org/presentationml/2006/main" preserve="1" userDrawn="1">
   <p:cSld name="Kapiteltrenner">
     <p:spTree>
@@ -4801,7 +4554,7 @@
 
 <file path=ppt/slideLayouts/slideLayout8.xml><?xml version="1.0" encoding="utf-8"?>
 <p:sldLayout xmlns:a="http://schemas.openxmlformats.org/drawingml/2006/main" xmlns:r="http://schemas.openxmlformats.org/officeDocument/2006/relationships" xmlns:p="http://schemas.openxmlformats.org/presentationml/2006/main" userDrawn="1">
-  <p:cSld name="Bilder formatfüllend">
+  <p:cSld name="Zwei Inhalte + Text (Hintergrund)">
     <p:spTree>
       <p:nvGrpSpPr>
         <p:cNvPr id="1" name=""/>
@@ -4818,7 +4571,208 @@
       </p:grpSpPr>
       <p:sp>
         <p:nvSpPr>
-          <p:cNvPr id="8" name="Bildplatzhalter 2"/>
+          <p:cNvPr id="9" name="Rechteck 8"/>
+          <p:cNvSpPr/>
+          <p:nvPr userDrawn="1"/>
+        </p:nvSpPr>
+        <p:spPr bwMode="auto">
+          <a:xfrm>
+            <a:off x="0" y="2477139"/>
+            <a:ext cx="9144000" cy="4380861"/>
+          </a:xfrm>
+          <a:prstGeom prst="rect">
+            <a:avLst/>
+          </a:prstGeom>
+          <a:solidFill>
+            <a:schemeClr val="bg1">
+              <a:lumMod val="95000"/>
+            </a:schemeClr>
+          </a:solidFill>
+          <a:ln w="9525" cap="flat" cmpd="sng" algn="ctr">
+            <a:noFill/>
+            <a:prstDash val="solid"/>
+            <a:round/>
+            <a:headEnd type="none" w="med" len="med"/>
+            <a:tailEnd type="none" w="med" len="med"/>
+          </a:ln>
+          <a:effectLst/>
+        </p:spPr>
+        <p:txBody>
+          <a:bodyPr vert="horz" wrap="square" lIns="91440" tIns="45720" rIns="91440" bIns="45720" numCol="1" rtlCol="0" anchor="t" anchorCtr="0" compatLnSpc="1">
+            <a:prstTxWarp prst="textNoShape">
+              <a:avLst/>
+            </a:prstTxWarp>
+          </a:bodyPr>
+          <a:lstStyle/>
+          <a:p>
+            <a:pPr algn="r" eaLnBrk="0" hangingPunct="0"/>
+            <a:endParaRPr lang="de-DE" sz="1000">
+              <a:latin typeface="Arial" pitchFamily="34" charset="0"/>
+            </a:endParaRPr>
+          </a:p>
+        </p:txBody>
+      </p:sp>
+      <p:sp>
+        <p:nvSpPr>
+          <p:cNvPr id="18" name="Textplatzhalter 7"/>
+          <p:cNvSpPr>
+            <a:spLocks noGrp="1"/>
+          </p:cNvSpPr>
+          <p:nvPr>
+            <p:ph type="body" sz="quarter" idx="13" hasCustomPrompt="1"/>
+          </p:nvPr>
+        </p:nvSpPr>
+        <p:spPr>
+          <a:xfrm>
+            <a:off x="319089" y="1762188"/>
+            <a:ext cx="8508999" cy="714951"/>
+          </a:xfrm>
+          <a:prstGeom prst="rect">
+            <a:avLst/>
+          </a:prstGeom>
+          <a:noFill/>
+          <a:ln w="9525">
+            <a:noFill/>
+            <a:miter lim="800000"/>
+            <a:headEnd/>
+            <a:tailEnd/>
+          </a:ln>
+        </p:spPr>
+        <p:txBody>
+          <a:bodyPr vert="horz" wrap="square" lIns="0" tIns="0" rIns="0" bIns="0" numCol="1" anchor="t" anchorCtr="0" compatLnSpc="1">
+            <a:prstTxWarp prst="textNoShape">
+              <a:avLst/>
+            </a:prstTxWarp>
+          </a:bodyPr>
+          <a:lstStyle>
+            <a:lvl1pPr>
+              <a:lnSpc>
+                <a:spcPct val="114000"/>
+              </a:lnSpc>
+              <a:defRPr lang="de-DE" noProof="0" dirty="0" smtClean="0"/>
+            </a:lvl1pPr>
+          </a:lstStyle>
+          <a:p>
+            <a:pPr lvl="0"/>
+            <a:r>
+              <a:rPr lang="de-DE" noProof="0" dirty="0"/>
+              <a:t>Inhalt durch Klicken bearbeiten</a:t>
+            </a:r>
+          </a:p>
+        </p:txBody>
+      </p:sp>
+      <p:sp>
+        <p:nvSpPr>
+          <p:cNvPr id="7" name="Foliennummernplatzhalter 6"/>
+          <p:cNvSpPr>
+            <a:spLocks noGrp="1"/>
+          </p:cNvSpPr>
+          <p:nvPr>
+            <p:ph type="sldNum" sz="quarter" idx="15"/>
+          </p:nvPr>
+        </p:nvSpPr>
+        <p:spPr/>
+        <p:txBody>
+          <a:bodyPr/>
+          <a:lstStyle/>
+          <a:p>
+            <a:fld id="{CE58CB1E-F828-4F11-99E0-327109AF9DA4}" type="slidenum">
+              <a:rPr lang="de-DE" smtClean="0"/>
+              <a:pPr/>
+              <a:t>‹Nr.›</a:t>
+            </a:fld>
+            <a:endParaRPr lang="de-DE" dirty="0"/>
+          </a:p>
+        </p:txBody>
+      </p:sp>
+      <p:sp>
+        <p:nvSpPr>
+          <p:cNvPr id="12" name="Fußzeilenplatzhalter 11"/>
+          <p:cNvSpPr>
+            <a:spLocks noGrp="1"/>
+          </p:cNvSpPr>
+          <p:nvPr>
+            <p:ph type="ftr" sz="quarter" idx="16"/>
+          </p:nvPr>
+        </p:nvSpPr>
+        <p:spPr/>
+        <p:txBody>
+          <a:bodyPr/>
+          <a:lstStyle/>
+          <a:p>
+            <a:r>
+              <a:rPr lang="de-DE" noProof="0"/>
+              <a:t>Dr. rer. nat. Erika Mustermann (TUM) | kann beliebig erweitert werden | Infos mit Strich trennen</a:t>
+            </a:r>
+          </a:p>
+        </p:txBody>
+      </p:sp>
+      <p:sp>
+        <p:nvSpPr>
+          <p:cNvPr id="8" name="Inhaltsplatzhalter 9"/>
+          <p:cNvSpPr>
+            <a:spLocks noGrp="1"/>
+          </p:cNvSpPr>
+          <p:nvPr>
+            <p:ph sz="quarter" idx="18"/>
+          </p:nvPr>
+        </p:nvSpPr>
+        <p:spPr>
+          <a:xfrm>
+            <a:off x="316992" y="2484000"/>
+            <a:ext cx="4242816" cy="3974655"/>
+          </a:xfrm>
+          <a:prstGeom prst="rect">
+            <a:avLst/>
+          </a:prstGeom>
+        </p:spPr>
+        <p:txBody>
+          <a:bodyPr lIns="0" rIns="0"/>
+          <a:lstStyle>
+            <a:lvl1pPr>
+              <a:defRPr lang="de-DE" sz="1600" kern="1200" noProof="0" dirty="0" smtClean="0">
+                <a:solidFill>
+                  <a:schemeClr val="tx1"/>
+                </a:solidFill>
+                <a:latin typeface="+mn-lt"/>
+                <a:ea typeface="+mn-ea"/>
+                <a:cs typeface="+mn-cs"/>
+              </a:defRPr>
+            </a:lvl1pPr>
+            <a:lvl2pPr>
+              <a:defRPr/>
+            </a:lvl2pPr>
+            <a:lvl3pPr>
+              <a:defRPr sz="1600" baseline="0"/>
+            </a:lvl3pPr>
+          </a:lstStyle>
+          <a:p>
+            <a:pPr lvl="0"/>
+            <a:r>
+              <a:rPr lang="de-DE" dirty="0"/>
+              <a:t>Textmasterformate durch Klicken bearbeiten</a:t>
+            </a:r>
+          </a:p>
+          <a:p>
+            <a:pPr lvl="1"/>
+            <a:r>
+              <a:rPr lang="de-DE" dirty="0"/>
+              <a:t>Zweite Ebene</a:t>
+            </a:r>
+          </a:p>
+          <a:p>
+            <a:pPr lvl="2"/>
+            <a:r>
+              <a:rPr lang="de-DE" sz="1600" dirty="0"/>
+              <a:t>Dritte Ebene</a:t>
+            </a:r>
+            <a:endParaRPr lang="de-DE" dirty="0"/>
+          </a:p>
+        </p:txBody>
+      </p:sp>
+      <p:sp>
+        <p:nvSpPr>
+          <p:cNvPr id="11" name="Bildplatzhalter 2"/>
           <p:cNvSpPr>
             <a:spLocks noGrp="1"/>
           </p:cNvSpPr>
@@ -4828,8 +4782,8 @@
         </p:nvSpPr>
         <p:spPr>
           <a:xfrm>
-            <a:off x="0" y="1691640"/>
-            <a:ext cx="9144000" cy="5166360"/>
+            <a:off x="4584192" y="2484120"/>
+            <a:ext cx="4244400" cy="3974400"/>
           </a:xfrm>
           <a:prstGeom prst="rect">
             <a:avLst/>
@@ -4852,12 +4806,214 @@
       </p:sp>
       <p:sp>
         <p:nvSpPr>
-          <p:cNvPr id="6" name="Foliennummernplatzhalter 5"/>
+          <p:cNvPr id="10" name="Titel 1"/>
           <p:cNvSpPr>
             <a:spLocks noGrp="1"/>
           </p:cNvSpPr>
           <p:nvPr>
-            <p:ph type="sldNum" sz="quarter" idx="15"/>
+            <p:ph type="title" hasCustomPrompt="1"/>
+          </p:nvPr>
+        </p:nvSpPr>
+        <p:spPr>
+          <a:xfrm>
+            <a:off x="319090" y="994334"/>
+            <a:ext cx="8508999" cy="410369"/>
+          </a:xfrm>
+          <a:prstGeom prst="rect">
+            <a:avLst/>
+          </a:prstGeom>
+          <a:noFill/>
+          <a:ln w="9525">
+            <a:noFill/>
+            <a:miter lim="800000"/>
+            <a:headEnd/>
+            <a:tailEnd/>
+          </a:ln>
+        </p:spPr>
+        <p:txBody>
+          <a:bodyPr vert="horz" wrap="square" lIns="0" tIns="0" rIns="0" bIns="0" numCol="1" anchor="t" anchorCtr="0" compatLnSpc="1">
+            <a:prstTxWarp prst="textNoShape">
+              <a:avLst/>
+            </a:prstTxWarp>
+            <a:spAutoFit/>
+          </a:bodyPr>
+          <a:lstStyle>
+            <a:lvl1pPr>
+              <a:lnSpc>
+                <a:spcPts val="3200"/>
+              </a:lnSpc>
+              <a:defRPr lang="de-DE" sz="3000" noProof="0" dirty="0"/>
+            </a:lvl1pPr>
+          </a:lstStyle>
+          <a:p>
+            <a:pPr lvl="0"/>
+            <a:r>
+              <a:rPr lang="de-DE" noProof="0" dirty="0"/>
+              <a:t>Titel durch Klicken bearbeiten</a:t>
+            </a:r>
+          </a:p>
+        </p:txBody>
+      </p:sp>
+    </p:spTree>
+    <p:extLst>
+      <p:ext uri="{BB962C8B-B14F-4D97-AF65-F5344CB8AC3E}">
+        <p14:creationId xmlns:p14="http://schemas.microsoft.com/office/powerpoint/2010/main" val="1790675"/>
+      </p:ext>
+    </p:extLst>
+  </p:cSld>
+  <p:clrMapOvr>
+    <a:masterClrMapping/>
+  </p:clrMapOvr>
+</p:sldLayout>
+</file>
+
+<file path=ppt/slideLayouts/slideLayout9.xml><?xml version="1.0" encoding="utf-8"?>
+<p:sldLayout xmlns:a="http://schemas.openxmlformats.org/drawingml/2006/main" xmlns:r="http://schemas.openxmlformats.org/officeDocument/2006/relationships" xmlns:p="http://schemas.openxmlformats.org/presentationml/2006/main" preserve="1" userDrawn="1">
+  <p:cSld name="Start">
+    <p:spTree>
+      <p:nvGrpSpPr>
+        <p:cNvPr id="1" name=""/>
+        <p:cNvGrpSpPr/>
+        <p:nvPr/>
+      </p:nvGrpSpPr>
+      <p:grpSpPr>
+        <a:xfrm>
+          <a:off x="0" y="0"/>
+          <a:ext cx="0" cy="0"/>
+          <a:chOff x="0" y="0"/>
+          <a:chExt cx="0" cy="0"/>
+        </a:xfrm>
+      </p:grpSpPr>
+      <p:sp>
+        <p:nvSpPr>
+          <p:cNvPr id="16" name="Inhaltsplatzhalter 2"/>
+          <p:cNvSpPr>
+            <a:spLocks noGrp="1"/>
+          </p:cNvSpPr>
+          <p:nvPr>
+            <p:ph idx="10" hasCustomPrompt="1"/>
+          </p:nvPr>
+        </p:nvSpPr>
+        <p:spPr>
+          <a:xfrm>
+            <a:off x="319088" y="1978720"/>
+            <a:ext cx="8508999" cy="1274125"/>
+          </a:xfrm>
+          <a:prstGeom prst="rect">
+            <a:avLst/>
+          </a:prstGeom>
+          <a:noFill/>
+          <a:ln w="9525">
+            <a:noFill/>
+            <a:miter lim="800000"/>
+            <a:headEnd/>
+            <a:tailEnd/>
+          </a:ln>
+        </p:spPr>
+        <p:txBody>
+          <a:bodyPr vert="horz" wrap="square" lIns="0" tIns="0" rIns="0" bIns="0" numCol="1" anchor="t" anchorCtr="0" compatLnSpc="1">
+            <a:prstTxWarp prst="textNoShape">
+              <a:avLst/>
+            </a:prstTxWarp>
+          </a:bodyPr>
+          <a:lstStyle>
+            <a:lvl1pPr>
+              <a:lnSpc>
+                <a:spcPct val="150000"/>
+              </a:lnSpc>
+              <a:defRPr lang="de-DE" sz="1600" baseline="0" noProof="0" dirty="0" smtClean="0"/>
+            </a:lvl1pPr>
+            <a:lvl2pPr>
+              <a:defRPr lang="de-DE" noProof="0" dirty="0" smtClean="0"/>
+            </a:lvl2pPr>
+          </a:lstStyle>
+          <a:p>
+            <a:pPr lvl="0"/>
+            <a:r>
+              <a:rPr lang="de-DE" noProof="0" dirty="0"/>
+              <a:t>Referent</a:t>
+            </a:r>
+            <a:br>
+              <a:rPr lang="de-DE" noProof="0" dirty="0"/>
+            </a:br>
+            <a:r>
+              <a:rPr lang="de-DE" noProof="0" dirty="0"/>
+              <a:t>Ort, Datum (Schreibweise: 00. Januar 2015)</a:t>
+            </a:r>
+          </a:p>
+        </p:txBody>
+      </p:sp>
+      <p:sp>
+        <p:nvSpPr>
+          <p:cNvPr id="14" name="Rechteck 13"/>
+          <p:cNvSpPr/>
+          <p:nvPr userDrawn="1"/>
+        </p:nvSpPr>
+        <p:spPr bwMode="auto">
+          <a:xfrm>
+            <a:off x="8347635" y="6408271"/>
+            <a:ext cx="575236" cy="358588"/>
+          </a:xfrm>
+          <a:prstGeom prst="rect">
+            <a:avLst/>
+          </a:prstGeom>
+          <a:solidFill>
+            <a:schemeClr val="bg1"/>
+          </a:solidFill>
+          <a:ln w="9525" cap="flat" cmpd="sng" algn="ctr">
+            <a:noFill/>
+            <a:prstDash val="solid"/>
+            <a:round/>
+            <a:headEnd type="none" w="med" len="med"/>
+            <a:tailEnd type="none" w="med" len="med"/>
+          </a:ln>
+          <a:effectLst/>
+        </p:spPr>
+        <p:txBody>
+          <a:bodyPr vert="horz" wrap="square" lIns="91440" tIns="45720" rIns="91440" bIns="45720" numCol="1" rtlCol="0" anchor="t" anchorCtr="0" compatLnSpc="1">
+            <a:prstTxWarp prst="textNoShape">
+              <a:avLst/>
+            </a:prstTxWarp>
+          </a:bodyPr>
+          <a:lstStyle/>
+          <a:p>
+            <a:pPr marL="0" marR="0" indent="0" algn="r" defTabSz="914400" rtl="0" eaLnBrk="0" fontAlgn="base" latinLnBrk="0" hangingPunct="0">
+              <a:lnSpc>
+                <a:spcPct val="100000"/>
+              </a:lnSpc>
+              <a:spcBef>
+                <a:spcPct val="0"/>
+              </a:spcBef>
+              <a:spcAft>
+                <a:spcPct val="0"/>
+              </a:spcAft>
+              <a:buClrTx/>
+              <a:buSzTx/>
+              <a:buFontTx/>
+              <a:buNone/>
+              <a:tabLst/>
+            </a:pPr>
+            <a:endParaRPr kumimoji="0" lang="de-DE" sz="2000" b="0" i="0" u="none" strike="noStrike" cap="none" normalizeH="0" baseline="0">
+              <a:ln>
+                <a:noFill/>
+              </a:ln>
+              <a:solidFill>
+                <a:schemeClr val="tx1"/>
+              </a:solidFill>
+              <a:effectLst/>
+              <a:latin typeface="Arial" pitchFamily="34" charset="0"/>
+            </a:endParaRPr>
+          </a:p>
+        </p:txBody>
+      </p:sp>
+      <p:sp>
+        <p:nvSpPr>
+          <p:cNvPr id="8" name="Foliennummernplatzhalter 7"/>
+          <p:cNvSpPr>
+            <a:spLocks noGrp="1"/>
+          </p:cNvSpPr>
+          <p:nvPr>
+            <p:ph type="sldNum" sz="quarter" idx="12"/>
           </p:nvPr>
         </p:nvSpPr>
         <p:spPr/>
@@ -4881,7 +5037,7 @@
             <a:spLocks noGrp="1"/>
           </p:cNvSpPr>
           <p:nvPr>
-            <p:ph type="ftr" sz="quarter" idx="16"/>
+            <p:ph type="ftr" sz="quarter" idx="13"/>
           </p:nvPr>
         </p:nvSpPr>
         <p:spPr/>
@@ -4950,322 +5106,7 @@
     </p:spTree>
     <p:extLst>
       <p:ext uri="{BB962C8B-B14F-4D97-AF65-F5344CB8AC3E}">
-        <p14:creationId xmlns:p14="http://schemas.microsoft.com/office/powerpoint/2010/main" val="2435256476"/>
-      </p:ext>
-    </p:extLst>
-  </p:cSld>
-  <p:clrMapOvr>
-    <a:masterClrMapping/>
-  </p:clrMapOvr>
-</p:sldLayout>
-</file>
-
-<file path=ppt/slideLayouts/slideLayout9.xml><?xml version="1.0" encoding="utf-8"?>
-<p:sldLayout xmlns:a="http://schemas.openxmlformats.org/drawingml/2006/main" xmlns:r="http://schemas.openxmlformats.org/officeDocument/2006/relationships" xmlns:p="http://schemas.openxmlformats.org/presentationml/2006/main" userDrawn="1">
-  <p:cSld name="Zwei Inhalte + Text (Hintergrund)">
-    <p:spTree>
-      <p:nvGrpSpPr>
-        <p:cNvPr id="1" name=""/>
-        <p:cNvGrpSpPr/>
-        <p:nvPr/>
-      </p:nvGrpSpPr>
-      <p:grpSpPr>
-        <a:xfrm>
-          <a:off x="0" y="0"/>
-          <a:ext cx="0" cy="0"/>
-          <a:chOff x="0" y="0"/>
-          <a:chExt cx="0" cy="0"/>
-        </a:xfrm>
-      </p:grpSpPr>
-      <p:sp>
-        <p:nvSpPr>
-          <p:cNvPr id="9" name="Rechteck 8"/>
-          <p:cNvSpPr/>
-          <p:nvPr userDrawn="1"/>
-        </p:nvSpPr>
-        <p:spPr bwMode="auto">
-          <a:xfrm>
-            <a:off x="0" y="2477139"/>
-            <a:ext cx="9144000" cy="4380861"/>
-          </a:xfrm>
-          <a:prstGeom prst="rect">
-            <a:avLst/>
-          </a:prstGeom>
-          <a:solidFill>
-            <a:schemeClr val="bg1">
-              <a:lumMod val="95000"/>
-            </a:schemeClr>
-          </a:solidFill>
-          <a:ln w="9525" cap="flat" cmpd="sng" algn="ctr">
-            <a:noFill/>
-            <a:prstDash val="solid"/>
-            <a:round/>
-            <a:headEnd type="none" w="med" len="med"/>
-            <a:tailEnd type="none" w="med" len="med"/>
-          </a:ln>
-          <a:effectLst/>
-        </p:spPr>
-        <p:txBody>
-          <a:bodyPr vert="horz" wrap="square" lIns="91440" tIns="45720" rIns="91440" bIns="45720" numCol="1" rtlCol="0" anchor="t" anchorCtr="0" compatLnSpc="1">
-            <a:prstTxWarp prst="textNoShape">
-              <a:avLst/>
-            </a:prstTxWarp>
-          </a:bodyPr>
-          <a:lstStyle/>
-          <a:p>
-            <a:pPr algn="r" eaLnBrk="0" hangingPunct="0"/>
-            <a:endParaRPr lang="de-DE" sz="1000">
-              <a:latin typeface="Arial" pitchFamily="34" charset="0"/>
-            </a:endParaRPr>
-          </a:p>
-        </p:txBody>
-      </p:sp>
-      <p:sp>
-        <p:nvSpPr>
-          <p:cNvPr id="18" name="Textplatzhalter 7"/>
-          <p:cNvSpPr>
-            <a:spLocks noGrp="1"/>
-          </p:cNvSpPr>
-          <p:nvPr>
-            <p:ph type="body" sz="quarter" idx="13" hasCustomPrompt="1"/>
-          </p:nvPr>
-        </p:nvSpPr>
-        <p:spPr>
-          <a:xfrm>
-            <a:off x="319089" y="1762188"/>
-            <a:ext cx="8508999" cy="714951"/>
-          </a:xfrm>
-          <a:prstGeom prst="rect">
-            <a:avLst/>
-          </a:prstGeom>
-          <a:noFill/>
-          <a:ln w="9525">
-            <a:noFill/>
-            <a:miter lim="800000"/>
-            <a:headEnd/>
-            <a:tailEnd/>
-          </a:ln>
-        </p:spPr>
-        <p:txBody>
-          <a:bodyPr vert="horz" wrap="square" lIns="0" tIns="0" rIns="0" bIns="0" numCol="1" anchor="t" anchorCtr="0" compatLnSpc="1">
-            <a:prstTxWarp prst="textNoShape">
-              <a:avLst/>
-            </a:prstTxWarp>
-          </a:bodyPr>
-          <a:lstStyle>
-            <a:lvl1pPr>
-              <a:lnSpc>
-                <a:spcPct val="114000"/>
-              </a:lnSpc>
-              <a:defRPr lang="de-DE" noProof="0" dirty="0" smtClean="0"/>
-            </a:lvl1pPr>
-          </a:lstStyle>
-          <a:p>
-            <a:pPr lvl="0"/>
-            <a:r>
-              <a:rPr lang="de-DE" noProof="0" dirty="0"/>
-              <a:t>Inhalt durch Klicken bearbeiten</a:t>
-            </a:r>
-          </a:p>
-        </p:txBody>
-      </p:sp>
-      <p:sp>
-        <p:nvSpPr>
-          <p:cNvPr id="7" name="Foliennummernplatzhalter 6"/>
-          <p:cNvSpPr>
-            <a:spLocks noGrp="1"/>
-          </p:cNvSpPr>
-          <p:nvPr>
-            <p:ph type="sldNum" sz="quarter" idx="15"/>
-          </p:nvPr>
-        </p:nvSpPr>
-        <p:spPr/>
-        <p:txBody>
-          <a:bodyPr/>
-          <a:lstStyle/>
-          <a:p>
-            <a:fld id="{CE58CB1E-F828-4F11-99E0-327109AF9DA4}" type="slidenum">
-              <a:rPr lang="de-DE" smtClean="0"/>
-              <a:pPr/>
-              <a:t>‹Nr.›</a:t>
-            </a:fld>
-            <a:endParaRPr lang="de-DE" dirty="0"/>
-          </a:p>
-        </p:txBody>
-      </p:sp>
-      <p:sp>
-        <p:nvSpPr>
-          <p:cNvPr id="12" name="Fußzeilenplatzhalter 11"/>
-          <p:cNvSpPr>
-            <a:spLocks noGrp="1"/>
-          </p:cNvSpPr>
-          <p:nvPr>
-            <p:ph type="ftr" sz="quarter" idx="16"/>
-          </p:nvPr>
-        </p:nvSpPr>
-        <p:spPr/>
-        <p:txBody>
-          <a:bodyPr/>
-          <a:lstStyle/>
-          <a:p>
-            <a:r>
-              <a:rPr lang="de-DE" noProof="0"/>
-              <a:t>Dr. rer. nat. Erika Mustermann (TUM) | kann beliebig erweitert werden | Infos mit Strich trennen</a:t>
-            </a:r>
-          </a:p>
-        </p:txBody>
-      </p:sp>
-      <p:sp>
-        <p:nvSpPr>
-          <p:cNvPr id="8" name="Inhaltsplatzhalter 9"/>
-          <p:cNvSpPr>
-            <a:spLocks noGrp="1"/>
-          </p:cNvSpPr>
-          <p:nvPr>
-            <p:ph sz="quarter" idx="18"/>
-          </p:nvPr>
-        </p:nvSpPr>
-        <p:spPr>
-          <a:xfrm>
-            <a:off x="316992" y="2484000"/>
-            <a:ext cx="4242816" cy="3974655"/>
-          </a:xfrm>
-          <a:prstGeom prst="rect">
-            <a:avLst/>
-          </a:prstGeom>
-        </p:spPr>
-        <p:txBody>
-          <a:bodyPr lIns="0" rIns="0"/>
-          <a:lstStyle>
-            <a:lvl1pPr>
-              <a:defRPr lang="de-DE" sz="1600" kern="1200" noProof="0" dirty="0" smtClean="0">
-                <a:solidFill>
-                  <a:schemeClr val="tx1"/>
-                </a:solidFill>
-                <a:latin typeface="+mn-lt"/>
-                <a:ea typeface="+mn-ea"/>
-                <a:cs typeface="+mn-cs"/>
-              </a:defRPr>
-            </a:lvl1pPr>
-            <a:lvl2pPr>
-              <a:defRPr/>
-            </a:lvl2pPr>
-            <a:lvl3pPr>
-              <a:defRPr sz="1600" baseline="0"/>
-            </a:lvl3pPr>
-          </a:lstStyle>
-          <a:p>
-            <a:pPr lvl="0"/>
-            <a:r>
-              <a:rPr lang="de-DE" dirty="0"/>
-              <a:t>Textmasterformate durch Klicken bearbeiten</a:t>
-            </a:r>
-          </a:p>
-          <a:p>
-            <a:pPr lvl="1"/>
-            <a:r>
-              <a:rPr lang="de-DE" dirty="0"/>
-              <a:t>Zweite Ebene</a:t>
-            </a:r>
-          </a:p>
-          <a:p>
-            <a:pPr lvl="2"/>
-            <a:r>
-              <a:rPr lang="de-DE" sz="1600" dirty="0"/>
-              <a:t>Dritte Ebene</a:t>
-            </a:r>
-            <a:endParaRPr lang="de-DE" dirty="0"/>
-          </a:p>
-        </p:txBody>
-      </p:sp>
-      <p:sp>
-        <p:nvSpPr>
-          <p:cNvPr id="11" name="Bildplatzhalter 2"/>
-          <p:cNvSpPr>
-            <a:spLocks noGrp="1"/>
-          </p:cNvSpPr>
-          <p:nvPr>
-            <p:ph type="pic" sz="quarter" idx="14" hasCustomPrompt="1"/>
-          </p:nvPr>
-        </p:nvSpPr>
-        <p:spPr>
-          <a:xfrm>
-            <a:off x="4584192" y="2484120"/>
-            <a:ext cx="4244400" cy="3974400"/>
-          </a:xfrm>
-          <a:prstGeom prst="rect">
-            <a:avLst/>
-          </a:prstGeom>
-        </p:spPr>
-        <p:txBody>
-          <a:bodyPr/>
-          <a:lstStyle>
-            <a:lvl1pPr>
-              <a:lnSpc>
-                <a:spcPct val="114000"/>
-              </a:lnSpc>
-              <a:defRPr/>
-            </a:lvl1pPr>
-          </a:lstStyle>
-          <a:p>
-            <a:endParaRPr lang="de-DE" dirty="0"/>
-          </a:p>
-        </p:txBody>
-      </p:sp>
-      <p:sp>
-        <p:nvSpPr>
-          <p:cNvPr id="10" name="Titel 1"/>
-          <p:cNvSpPr>
-            <a:spLocks noGrp="1"/>
-          </p:cNvSpPr>
-          <p:nvPr>
-            <p:ph type="title" hasCustomPrompt="1"/>
-          </p:nvPr>
-        </p:nvSpPr>
-        <p:spPr>
-          <a:xfrm>
-            <a:off x="319090" y="994334"/>
-            <a:ext cx="8508999" cy="410369"/>
-          </a:xfrm>
-          <a:prstGeom prst="rect">
-            <a:avLst/>
-          </a:prstGeom>
-          <a:noFill/>
-          <a:ln w="9525">
-            <a:noFill/>
-            <a:miter lim="800000"/>
-            <a:headEnd/>
-            <a:tailEnd/>
-          </a:ln>
-        </p:spPr>
-        <p:txBody>
-          <a:bodyPr vert="horz" wrap="square" lIns="0" tIns="0" rIns="0" bIns="0" numCol="1" anchor="t" anchorCtr="0" compatLnSpc="1">
-            <a:prstTxWarp prst="textNoShape">
-              <a:avLst/>
-            </a:prstTxWarp>
-            <a:spAutoFit/>
-          </a:bodyPr>
-          <a:lstStyle>
-            <a:lvl1pPr>
-              <a:lnSpc>
-                <a:spcPts val="3200"/>
-              </a:lnSpc>
-              <a:defRPr lang="de-DE" sz="3000" noProof="0" dirty="0"/>
-            </a:lvl1pPr>
-          </a:lstStyle>
-          <a:p>
-            <a:pPr lvl="0"/>
-            <a:r>
-              <a:rPr lang="de-DE" noProof="0" dirty="0"/>
-              <a:t>Titel durch Klicken bearbeiten</a:t>
-            </a:r>
-          </a:p>
-        </p:txBody>
-      </p:sp>
-    </p:spTree>
-    <p:extLst>
-      <p:ext uri="{BB962C8B-B14F-4D97-AF65-F5344CB8AC3E}">
-        <p14:creationId xmlns:p14="http://schemas.microsoft.com/office/powerpoint/2010/main" val="1790675"/>
+        <p14:creationId xmlns:p14="http://schemas.microsoft.com/office/powerpoint/2010/main" val="171855092"/>
       </p:ext>
     </p:extLst>
   </p:cSld>
@@ -6531,7 +6372,7 @@
           <p:nvPr/>
         </p:nvPicPr>
         <p:blipFill>
-          <a:blip r:embed="rId9"/>
+          <a:blip r:embed="rId8"/>
           <a:stretch>
             <a:fillRect/>
           </a:stretch>
@@ -6644,8 +6485,7 @@
     <p:sldLayoutId id="2147483714" r:id="rId3"/>
     <p:sldLayoutId id="2147483715" r:id="rId4"/>
     <p:sldLayoutId id="2147483716" r:id="rId5"/>
-    <p:sldLayoutId id="2147483717" r:id="rId6"/>
-    <p:sldLayoutId id="2147483718" r:id="rId7"/>
+    <p:sldLayoutId id="2147483718" r:id="rId6"/>
   </p:sldLayoutIdLst>
   <p:hf hdr="0" dt="0"/>
   <p:txStyles>
@@ -8943,7 +8783,7 @@
             <a:spLocks noGrp="1"/>
           </p:cNvSpPr>
           <p:nvPr>
-            <p:ph idx="14"/>
+            <p:ph idx="1"/>
           </p:nvPr>
         </p:nvSpPr>
         <p:spPr/>
@@ -9083,7 +8923,7 @@
             <a:spLocks noGrp="1"/>
           </p:cNvSpPr>
           <p:nvPr>
-            <p:ph type="sldNum" sz="quarter" idx="16"/>
+            <p:ph type="sldNum" sz="quarter" idx="11"/>
           </p:nvPr>
         </p:nvSpPr>
         <p:spPr/>
@@ -10268,121 +10108,6 @@
       </p:grpSpPr>
       <p:sp>
         <p:nvSpPr>
-          <p:cNvPr id="2" name="Inhaltsplatzhalter 1">
-            <a:extLst>
-              <a:ext uri="{FF2B5EF4-FFF2-40B4-BE49-F238E27FC236}">
-                <a16:creationId xmlns:a16="http://schemas.microsoft.com/office/drawing/2014/main" id="{3062DB69-71E8-4728-B77F-B1B7C36D3BCA}"/>
-              </a:ext>
-            </a:extLst>
-          </p:cNvPr>
-          <p:cNvSpPr>
-            <a:spLocks noGrp="1"/>
-          </p:cNvSpPr>
-          <p:nvPr>
-            <p:ph idx="1"/>
-          </p:nvPr>
-        </p:nvSpPr>
-        <p:spPr/>
-        <p:txBody>
-          <a:bodyPr/>
-          <a:lstStyle/>
-          <a:p>
-            <a:r>
-              <a:rPr lang="de-DE" dirty="0"/>
-              <a:t>Findet Weg über verschiedene Indikatoren:</a:t>
-            </a:r>
-          </a:p>
-          <a:p>
-            <a:pPr marL="285750" indent="-285750">
-              <a:buFont typeface="Arial" panose="020B0604020202020204" pitchFamily="34" charset="0"/>
-              <a:buChar char="•"/>
-            </a:pPr>
-            <a:r>
-              <a:rPr lang="de-DE" dirty="0"/>
-              <a:t>Heat </a:t>
-            </a:r>
-            <a:r>
-              <a:rPr lang="de-DE" dirty="0" err="1"/>
-              <a:t>Distortion</a:t>
-            </a:r>
-            <a:r>
-              <a:rPr lang="de-DE" dirty="0"/>
-              <a:t>: Lava</a:t>
-            </a:r>
-          </a:p>
-          <a:p>
-            <a:pPr marL="285750" indent="-285750">
-              <a:buFont typeface="Arial" panose="020B0604020202020204" pitchFamily="34" charset="0"/>
-              <a:buChar char="•"/>
-            </a:pPr>
-            <a:r>
-              <a:rPr lang="de-DE" dirty="0"/>
-              <a:t>Luftzug: Gruben</a:t>
-            </a:r>
-          </a:p>
-          <a:p>
-            <a:pPr marL="285750" indent="-285750">
-              <a:buFont typeface="Arial" panose="020B0604020202020204" pitchFamily="34" charset="0"/>
-              <a:buChar char="•"/>
-            </a:pPr>
-            <a:endParaRPr lang="de-DE" dirty="0"/>
-          </a:p>
-          <a:p>
-            <a:r>
-              <a:rPr lang="de-DE" dirty="0"/>
-              <a:t>Kann Hindernissen ausweichen:</a:t>
-            </a:r>
-          </a:p>
-          <a:p>
-            <a:pPr marL="285750" indent="-285750">
-              <a:buFont typeface="Arial" panose="020B0604020202020204" pitchFamily="34" charset="0"/>
-              <a:buChar char="•"/>
-            </a:pPr>
-            <a:r>
-              <a:rPr lang="de-DE" dirty="0"/>
-              <a:t>Flügel: Gruben</a:t>
-            </a:r>
-          </a:p>
-          <a:p>
-            <a:pPr marL="285750" indent="-285750">
-              <a:buFont typeface="Arial" panose="020B0604020202020204" pitchFamily="34" charset="0"/>
-              <a:buChar char="•"/>
-            </a:pPr>
-            <a:r>
-              <a:rPr lang="de-DE" dirty="0"/>
-              <a:t>Anti-Heat: Lava</a:t>
-            </a:r>
-          </a:p>
-          <a:p>
-            <a:pPr marL="285750" indent="-285750">
-              <a:buFont typeface="Arial" panose="020B0604020202020204" pitchFamily="34" charset="0"/>
-              <a:buChar char="•"/>
-            </a:pPr>
-            <a:r>
-              <a:rPr lang="de-DE" dirty="0" err="1"/>
-              <a:t>Wumpus</a:t>
-            </a:r>
-            <a:r>
-              <a:rPr lang="de-DE" dirty="0"/>
-              <a:t> Slayer: </a:t>
-            </a:r>
-            <a:r>
-              <a:rPr lang="de-DE" dirty="0" err="1"/>
-              <a:t>Wumpus</a:t>
-            </a:r>
-            <a:endParaRPr lang="de-DE" dirty="0"/>
-          </a:p>
-          <a:p>
-            <a:pPr marL="285750" indent="-285750">
-              <a:buFont typeface="Arial" panose="020B0604020202020204" pitchFamily="34" charset="0"/>
-              <a:buChar char="•"/>
-            </a:pPr>
-            <a:endParaRPr lang="de-DE" dirty="0"/>
-          </a:p>
-        </p:txBody>
-      </p:sp>
-      <p:sp>
-        <p:nvSpPr>
           <p:cNvPr id="3" name="Foliennummernplatzhalter 2">
             <a:extLst>
               <a:ext uri="{FF2B5EF4-FFF2-40B4-BE49-F238E27FC236}">
@@ -10394,7 +10119,7 @@
             <a:spLocks noGrp="1"/>
           </p:cNvSpPr>
           <p:nvPr>
-            <p:ph type="sldNum" sz="quarter" idx="11"/>
+            <p:ph type="sldNum" sz="quarter" idx="15"/>
           </p:nvPr>
         </p:nvSpPr>
         <p:spPr/>
@@ -10408,35 +10133,6 @@
               <a:t>3</a:t>
             </a:fld>
             <a:endParaRPr lang="de-DE" dirty="0"/>
-          </a:p>
-        </p:txBody>
-      </p:sp>
-      <p:sp>
-        <p:nvSpPr>
-          <p:cNvPr id="4" name="Fußzeilenplatzhalter 3">
-            <a:extLst>
-              <a:ext uri="{FF2B5EF4-FFF2-40B4-BE49-F238E27FC236}">
-                <a16:creationId xmlns:a16="http://schemas.microsoft.com/office/drawing/2014/main" id="{FA8D2A42-40AB-482F-A132-F7E5C65FB361}"/>
-              </a:ext>
-            </a:extLst>
-          </p:cNvPr>
-          <p:cNvSpPr>
-            <a:spLocks noGrp="1"/>
-          </p:cNvSpPr>
-          <p:nvPr>
-            <p:ph type="ftr" sz="quarter" idx="12"/>
-          </p:nvPr>
-        </p:nvSpPr>
-        <p:spPr/>
-        <p:txBody>
-          <a:bodyPr/>
-          <a:lstStyle/>
-          <a:p>
-            <a:r>
-              <a:rPr lang="de-DE"/>
-              <a:t>Dr. rer. nat. Erika Mustermann (TUM) | kann beliebig erweitert werden | Infos mit Strich trennen</a:t>
-            </a:r>
-            <a:endParaRPr lang="en-US" dirty="0"/>
           </a:p>
         </p:txBody>
       </p:sp>
@@ -10465,6 +10161,129 @@
               <a:rPr lang="de-DE" dirty="0"/>
               <a:t>Spieler</a:t>
             </a:r>
+          </a:p>
+        </p:txBody>
+      </p:sp>
+      <p:sp>
+        <p:nvSpPr>
+          <p:cNvPr id="2" name="Inhaltsplatzhalter 1">
+            <a:extLst>
+              <a:ext uri="{FF2B5EF4-FFF2-40B4-BE49-F238E27FC236}">
+                <a16:creationId xmlns:a16="http://schemas.microsoft.com/office/drawing/2014/main" id="{3062DB69-71E8-4728-B77F-B1B7C36D3BCA}"/>
+              </a:ext>
+            </a:extLst>
+          </p:cNvPr>
+          <p:cNvSpPr>
+            <a:spLocks noGrp="1"/>
+          </p:cNvSpPr>
+          <p:nvPr>
+            <p:ph idx="4294967295"/>
+          </p:nvPr>
+        </p:nvSpPr>
+        <p:spPr>
+          <a:xfrm>
+            <a:off x="635000" y="1762125"/>
+            <a:ext cx="8509000" cy="4699000"/>
+          </a:xfrm>
+          <a:prstGeom prst="rect">
+            <a:avLst/>
+          </a:prstGeom>
+        </p:spPr>
+        <p:txBody>
+          <a:bodyPr/>
+          <a:lstStyle/>
+          <a:p>
+            <a:r>
+              <a:rPr lang="de-DE" dirty="0"/>
+              <a:t>Findet Weg über verschiedene Indikatoren:</a:t>
+            </a:r>
+          </a:p>
+          <a:p>
+            <a:pPr marL="285750" indent="-285750">
+              <a:buFont typeface="Arial" panose="020B0604020202020204" pitchFamily="34" charset="0"/>
+              <a:buChar char="•"/>
+            </a:pPr>
+            <a:r>
+              <a:rPr lang="de-DE" dirty="0"/>
+              <a:t>Heat </a:t>
+            </a:r>
+            <a:r>
+              <a:rPr lang="de-DE" dirty="0" err="1"/>
+              <a:t>Distortion</a:t>
+            </a:r>
+            <a:r>
+              <a:rPr lang="de-DE" dirty="0"/>
+              <a:t>: Lava</a:t>
+            </a:r>
+          </a:p>
+          <a:p>
+            <a:pPr marL="285750" indent="-285750">
+              <a:buFont typeface="Arial" panose="020B0604020202020204" pitchFamily="34" charset="0"/>
+              <a:buChar char="•"/>
+            </a:pPr>
+            <a:r>
+              <a:rPr lang="de-DE" dirty="0"/>
+              <a:t>Luftzug: Gruben</a:t>
+            </a:r>
+          </a:p>
+          <a:p>
+            <a:pPr marL="285750" indent="-285750">
+              <a:buFont typeface="Arial" panose="020B0604020202020204" pitchFamily="34" charset="0"/>
+              <a:buChar char="•"/>
+            </a:pPr>
+            <a:endParaRPr lang="de-DE" dirty="0"/>
+          </a:p>
+          <a:p>
+            <a:r>
+              <a:rPr lang="de-DE" dirty="0"/>
+              <a:t>Kann Hindernissen ausweichen:</a:t>
+            </a:r>
+          </a:p>
+          <a:p>
+            <a:pPr marL="285750" indent="-285750">
+              <a:buFont typeface="Arial" panose="020B0604020202020204" pitchFamily="34" charset="0"/>
+              <a:buChar char="•"/>
+            </a:pPr>
+            <a:r>
+              <a:rPr lang="de-DE" dirty="0"/>
+              <a:t>Flügel: Gruben</a:t>
+            </a:r>
+          </a:p>
+          <a:p>
+            <a:pPr marL="285750" indent="-285750">
+              <a:buFont typeface="Arial" panose="020B0604020202020204" pitchFamily="34" charset="0"/>
+              <a:buChar char="•"/>
+            </a:pPr>
+            <a:r>
+              <a:rPr lang="de-DE" dirty="0"/>
+              <a:t>Anti-Heat: Lava</a:t>
+            </a:r>
+          </a:p>
+          <a:p>
+            <a:pPr marL="285750" indent="-285750">
+              <a:buFont typeface="Arial" panose="020B0604020202020204" pitchFamily="34" charset="0"/>
+              <a:buChar char="•"/>
+            </a:pPr>
+            <a:r>
+              <a:rPr lang="de-DE" dirty="0" err="1"/>
+              <a:t>Wumpus</a:t>
+            </a:r>
+            <a:r>
+              <a:rPr lang="de-DE" dirty="0"/>
+              <a:t> Slayer: </a:t>
+            </a:r>
+            <a:r>
+              <a:rPr lang="de-DE" dirty="0" err="1"/>
+              <a:t>Wumpus</a:t>
+            </a:r>
+            <a:endParaRPr lang="de-DE" dirty="0"/>
+          </a:p>
+          <a:p>
+            <a:pPr marL="285750" indent="-285750">
+              <a:buFont typeface="Arial" panose="020B0604020202020204" pitchFamily="34" charset="0"/>
+              <a:buChar char="•"/>
+            </a:pPr>
+            <a:endParaRPr lang="de-DE" dirty="0"/>
           </a:p>
         </p:txBody>
       </p:sp>
@@ -11360,7 +11179,7 @@
               <a:t>Heat </a:t>
             </a:r>
             <a:r>
-              <a:rPr lang="de-DE"/>
+              <a:rPr lang="de-DE" dirty="0" err="1"/>
               <a:t>Distortion</a:t>
             </a:r>
             <a:endParaRPr lang="de-DE" dirty="0"/>
@@ -11397,6 +11216,17 @@
               <a:rPr lang="de-DE" dirty="0"/>
               <a:t>Gras</a:t>
             </a:r>
+          </a:p>
+          <a:p>
+            <a:pPr marL="285750" indent="-285750">
+              <a:buFont typeface="Arial" panose="020B0604020202020204" pitchFamily="34" charset="0"/>
+              <a:buChar char="•"/>
+            </a:pPr>
+            <a:r>
+              <a:rPr lang="de-DE" dirty="0" err="1"/>
+              <a:t>Dissolve</a:t>
+            </a:r>
+            <a:endParaRPr lang="de-DE" dirty="0"/>
           </a:p>
           <a:p>
             <a:pPr marL="285750" indent="-285750">
@@ -11439,35 +11269,6 @@
       </p:sp>
       <p:sp>
         <p:nvSpPr>
-          <p:cNvPr id="4" name="Fußzeilenplatzhalter 3">
-            <a:extLst>
-              <a:ext uri="{FF2B5EF4-FFF2-40B4-BE49-F238E27FC236}">
-                <a16:creationId xmlns:a16="http://schemas.microsoft.com/office/drawing/2014/main" id="{6A5DE039-052D-4949-9BC1-3DD92567C12E}"/>
-              </a:ext>
-            </a:extLst>
-          </p:cNvPr>
-          <p:cNvSpPr>
-            <a:spLocks noGrp="1"/>
-          </p:cNvSpPr>
-          <p:nvPr>
-            <p:ph type="ftr" sz="quarter" idx="12"/>
-          </p:nvPr>
-        </p:nvSpPr>
-        <p:spPr/>
-        <p:txBody>
-          <a:bodyPr/>
-          <a:lstStyle/>
-          <a:p>
-            <a:r>
-              <a:rPr lang="de-DE"/>
-              <a:t>Dr. rer. nat. Erika Mustermann (TUM) | kann beliebig erweitert werden | Infos mit Strich trennen</a:t>
-            </a:r>
-            <a:endParaRPr lang="en-US" dirty="0"/>
-          </a:p>
-        </p:txBody>
-      </p:sp>
-      <p:sp>
-        <p:nvSpPr>
           <p:cNvPr id="5" name="Titel 4">
             <a:extLst>
               <a:ext uri="{FF2B5EF4-FFF2-40B4-BE49-F238E27FC236}">
@@ -11499,6 +11300,348 @@
     <p:extLst>
       <p:ext uri="{BB962C8B-B14F-4D97-AF65-F5344CB8AC3E}">
         <p14:creationId xmlns:p14="http://schemas.microsoft.com/office/powerpoint/2010/main" val="1721190281"/>
+      </p:ext>
+    </p:extLst>
+  </p:cSld>
+  <p:clrMapOvr>
+    <a:masterClrMapping/>
+  </p:clrMapOvr>
+</p:sld>
+</file>
+
+<file path=ppt/slides/slide5.xml><?xml version="1.0" encoding="utf-8"?>
+<p:sld xmlns:a="http://schemas.openxmlformats.org/drawingml/2006/main" xmlns:r="http://schemas.openxmlformats.org/officeDocument/2006/relationships" xmlns:p="http://schemas.openxmlformats.org/presentationml/2006/main">
+  <p:cSld>
+    <p:spTree>
+      <p:nvGrpSpPr>
+        <p:cNvPr id="1" name=""/>
+        <p:cNvGrpSpPr/>
+        <p:nvPr/>
+      </p:nvGrpSpPr>
+      <p:grpSpPr>
+        <a:xfrm>
+          <a:off x="0" y="0"/>
+          <a:ext cx="0" cy="0"/>
+          <a:chOff x="0" y="0"/>
+          <a:chExt cx="0" cy="0"/>
+        </a:xfrm>
+      </p:grpSpPr>
+      <p:sp>
+        <p:nvSpPr>
+          <p:cNvPr id="2" name="Inhaltsplatzhalter 1">
+            <a:extLst>
+              <a:ext uri="{FF2B5EF4-FFF2-40B4-BE49-F238E27FC236}">
+                <a16:creationId xmlns:a16="http://schemas.microsoft.com/office/drawing/2014/main" id="{A715C718-F13A-40D7-8E78-B048411D4408}"/>
+              </a:ext>
+            </a:extLst>
+          </p:cNvPr>
+          <p:cNvSpPr>
+            <a:spLocks noGrp="1"/>
+          </p:cNvSpPr>
+          <p:nvPr>
+            <p:ph idx="1"/>
+          </p:nvPr>
+        </p:nvSpPr>
+        <p:spPr/>
+        <p:txBody>
+          <a:bodyPr/>
+          <a:lstStyle/>
+          <a:p>
+            <a:r>
+              <a:rPr lang="de-DE" dirty="0"/>
+              <a:t>Surface </a:t>
+            </a:r>
+            <a:r>
+              <a:rPr lang="de-DE" dirty="0" err="1"/>
+              <a:t>Shader</a:t>
+            </a:r>
+            <a:endParaRPr lang="de-DE" dirty="0"/>
+          </a:p>
+          <a:p>
+            <a:pPr marL="285750" indent="-285750">
+              <a:buFont typeface="Arial" panose="020B0604020202020204" pitchFamily="34" charset="0"/>
+              <a:buChar char="•"/>
+            </a:pPr>
+            <a:r>
+              <a:rPr lang="de-DE" dirty="0"/>
+              <a:t>Vertices werden nach außen gezogen</a:t>
+            </a:r>
+          </a:p>
+        </p:txBody>
+      </p:sp>
+      <p:sp>
+        <p:nvSpPr>
+          <p:cNvPr id="3" name="Foliennummernplatzhalter 2">
+            <a:extLst>
+              <a:ext uri="{FF2B5EF4-FFF2-40B4-BE49-F238E27FC236}">
+                <a16:creationId xmlns:a16="http://schemas.microsoft.com/office/drawing/2014/main" id="{C37B53D1-E61F-4DC6-B0F5-3E21CEAA3A26}"/>
+              </a:ext>
+            </a:extLst>
+          </p:cNvPr>
+          <p:cNvSpPr>
+            <a:spLocks noGrp="1"/>
+          </p:cNvSpPr>
+          <p:nvPr>
+            <p:ph type="sldNum" sz="quarter" idx="11"/>
+          </p:nvPr>
+        </p:nvSpPr>
+        <p:spPr/>
+        <p:txBody>
+          <a:bodyPr/>
+          <a:lstStyle/>
+          <a:p>
+            <a:fld id="{CE58CB1E-F828-4F11-99E0-327109AF9DA4}" type="slidenum">
+              <a:rPr lang="de-DE" smtClean="0"/>
+              <a:pPr/>
+              <a:t>5</a:t>
+            </a:fld>
+            <a:endParaRPr lang="de-DE" dirty="0"/>
+          </a:p>
+        </p:txBody>
+      </p:sp>
+      <p:sp>
+        <p:nvSpPr>
+          <p:cNvPr id="5" name="Titel 4">
+            <a:extLst>
+              <a:ext uri="{FF2B5EF4-FFF2-40B4-BE49-F238E27FC236}">
+                <a16:creationId xmlns:a16="http://schemas.microsoft.com/office/drawing/2014/main" id="{4287EF26-A734-4871-875C-F50CA04DC08B}"/>
+              </a:ext>
+            </a:extLst>
+          </p:cNvPr>
+          <p:cNvSpPr>
+            <a:spLocks noGrp="1"/>
+          </p:cNvSpPr>
+          <p:nvPr>
+            <p:ph type="title"/>
+          </p:nvPr>
+        </p:nvSpPr>
+        <p:spPr/>
+        <p:txBody>
+          <a:bodyPr/>
+          <a:lstStyle/>
+          <a:p>
+            <a:r>
+              <a:rPr lang="de-DE" dirty="0"/>
+              <a:t>Anti-Heat</a:t>
+            </a:r>
+          </a:p>
+        </p:txBody>
+      </p:sp>
+    </p:spTree>
+    <p:extLst>
+      <p:ext uri="{BB962C8B-B14F-4D97-AF65-F5344CB8AC3E}">
+        <p14:creationId xmlns:p14="http://schemas.microsoft.com/office/powerpoint/2010/main" val="848087771"/>
+      </p:ext>
+    </p:extLst>
+  </p:cSld>
+  <p:clrMapOvr>
+    <a:masterClrMapping/>
+  </p:clrMapOvr>
+</p:sld>
+</file>
+
+<file path=ppt/slides/slide6.xml><?xml version="1.0" encoding="utf-8"?>
+<p:sld xmlns:a="http://schemas.openxmlformats.org/drawingml/2006/main" xmlns:r="http://schemas.openxmlformats.org/officeDocument/2006/relationships" xmlns:p="http://schemas.openxmlformats.org/presentationml/2006/main">
+  <p:cSld>
+    <p:spTree>
+      <p:nvGrpSpPr>
+        <p:cNvPr id="1" name=""/>
+        <p:cNvGrpSpPr/>
+        <p:nvPr/>
+      </p:nvGrpSpPr>
+      <p:grpSpPr>
+        <a:xfrm>
+          <a:off x="0" y="0"/>
+          <a:ext cx="0" cy="0"/>
+          <a:chOff x="0" y="0"/>
+          <a:chExt cx="0" cy="0"/>
+        </a:xfrm>
+      </p:grpSpPr>
+      <p:sp>
+        <p:nvSpPr>
+          <p:cNvPr id="2" name="Inhaltsplatzhalter 1">
+            <a:extLst>
+              <a:ext uri="{FF2B5EF4-FFF2-40B4-BE49-F238E27FC236}">
+                <a16:creationId xmlns:a16="http://schemas.microsoft.com/office/drawing/2014/main" id="{712D11AD-0612-46E3-91B2-5372D05DBCF9}"/>
+              </a:ext>
+            </a:extLst>
+          </p:cNvPr>
+          <p:cNvSpPr>
+            <a:spLocks noGrp="1"/>
+          </p:cNvSpPr>
+          <p:nvPr>
+            <p:ph idx="1"/>
+          </p:nvPr>
+        </p:nvSpPr>
+        <p:spPr/>
+        <p:txBody>
+          <a:bodyPr/>
+          <a:lstStyle/>
+          <a:p>
+            <a:r>
+              <a:rPr lang="de-DE" dirty="0" err="1"/>
+              <a:t>Geometry</a:t>
+            </a:r>
+            <a:r>
+              <a:rPr lang="de-DE" dirty="0"/>
+              <a:t> </a:t>
+            </a:r>
+            <a:r>
+              <a:rPr lang="de-DE" dirty="0" err="1"/>
+              <a:t>Shader</a:t>
+            </a:r>
+            <a:endParaRPr lang="de-DE" dirty="0"/>
+          </a:p>
+          <a:p>
+            <a:pPr marL="285750" indent="-285750">
+              <a:buFont typeface="Arial" panose="020B0604020202020204" pitchFamily="34" charset="0"/>
+              <a:buChar char="•"/>
+            </a:pPr>
+            <a:r>
+              <a:rPr lang="de-DE" dirty="0"/>
+              <a:t>Vertices werden von </a:t>
+            </a:r>
+            <a:r>
+              <a:rPr lang="de-DE" dirty="0" err="1"/>
+              <a:t>GrassVertexGenerator</a:t>
+            </a:r>
+            <a:r>
+              <a:rPr lang="de-DE" dirty="0"/>
+              <a:t> übergeben</a:t>
+            </a:r>
+          </a:p>
+          <a:p>
+            <a:pPr marL="461963" lvl="1" indent="-285750">
+              <a:buFont typeface="Arial" panose="020B0604020202020204" pitchFamily="34" charset="0"/>
+              <a:buChar char="•"/>
+            </a:pPr>
+            <a:r>
+              <a:rPr lang="de-DE" dirty="0" err="1"/>
+              <a:t>Raycast</a:t>
+            </a:r>
+            <a:r>
+              <a:rPr lang="de-DE" dirty="0"/>
+              <a:t> um Terrain abzufragen</a:t>
+            </a:r>
+          </a:p>
+          <a:p>
+            <a:pPr marL="461963" lvl="1" indent="-285750">
+              <a:buFont typeface="Arial" panose="020B0604020202020204" pitchFamily="34" charset="0"/>
+              <a:buChar char="•"/>
+            </a:pPr>
+            <a:r>
+              <a:rPr lang="de-DE" dirty="0"/>
+              <a:t>Verteilung über </a:t>
+            </a:r>
+            <a:r>
+              <a:rPr lang="de-DE" dirty="0" err="1"/>
+              <a:t>PerlinNoise</a:t>
+            </a:r>
+            <a:endParaRPr lang="de-DE" dirty="0"/>
+          </a:p>
+          <a:p>
+            <a:pPr marL="461963" lvl="1" indent="-285750">
+              <a:buFont typeface="Arial" panose="020B0604020202020204" pitchFamily="34" charset="0"/>
+              <a:buChar char="•"/>
+            </a:pPr>
+            <a:r>
+              <a:rPr lang="de-DE" dirty="0"/>
+              <a:t>Random Color</a:t>
+            </a:r>
+          </a:p>
+          <a:p>
+            <a:pPr marL="285750" indent="-285750">
+              <a:buFont typeface="Arial" panose="020B0604020202020204" pitchFamily="34" charset="0"/>
+              <a:buChar char="•"/>
+            </a:pPr>
+            <a:r>
+              <a:rPr lang="de-DE" dirty="0"/>
+              <a:t>Quad wird anhand von v0 und v1 gezeichnet</a:t>
+            </a:r>
+          </a:p>
+          <a:p>
+            <a:pPr marL="461963" lvl="1" indent="-285750">
+              <a:buFont typeface="Arial" panose="020B0604020202020204" pitchFamily="34" charset="0"/>
+              <a:buChar char="•"/>
+            </a:pPr>
+            <a:r>
+              <a:rPr lang="de-DE" dirty="0"/>
+              <a:t>V1 wird passend zu </a:t>
+            </a:r>
+            <a:r>
+              <a:rPr lang="de-DE" dirty="0" err="1"/>
+              <a:t>Camera</a:t>
+            </a:r>
+            <a:r>
+              <a:rPr lang="de-DE"/>
+              <a:t> berechnet</a:t>
+            </a:r>
+            <a:endParaRPr lang="de-DE" dirty="0"/>
+          </a:p>
+        </p:txBody>
+      </p:sp>
+      <p:sp>
+        <p:nvSpPr>
+          <p:cNvPr id="3" name="Foliennummernplatzhalter 2">
+            <a:extLst>
+              <a:ext uri="{FF2B5EF4-FFF2-40B4-BE49-F238E27FC236}">
+                <a16:creationId xmlns:a16="http://schemas.microsoft.com/office/drawing/2014/main" id="{59B5BB3F-3DA7-4BC2-8D1A-BA7D88C93ACB}"/>
+              </a:ext>
+            </a:extLst>
+          </p:cNvPr>
+          <p:cNvSpPr>
+            <a:spLocks noGrp="1"/>
+          </p:cNvSpPr>
+          <p:nvPr>
+            <p:ph type="sldNum" sz="quarter" idx="11"/>
+          </p:nvPr>
+        </p:nvSpPr>
+        <p:spPr/>
+        <p:txBody>
+          <a:bodyPr/>
+          <a:lstStyle/>
+          <a:p>
+            <a:fld id="{CE58CB1E-F828-4F11-99E0-327109AF9DA4}" type="slidenum">
+              <a:rPr lang="de-DE" smtClean="0"/>
+              <a:pPr/>
+              <a:t>6</a:t>
+            </a:fld>
+            <a:endParaRPr lang="de-DE" dirty="0"/>
+          </a:p>
+        </p:txBody>
+      </p:sp>
+      <p:sp>
+        <p:nvSpPr>
+          <p:cNvPr id="5" name="Titel 4">
+            <a:extLst>
+              <a:ext uri="{FF2B5EF4-FFF2-40B4-BE49-F238E27FC236}">
+                <a16:creationId xmlns:a16="http://schemas.microsoft.com/office/drawing/2014/main" id="{49C4DF13-8B61-4A43-AFA9-B97A0BAA61CD}"/>
+              </a:ext>
+            </a:extLst>
+          </p:cNvPr>
+          <p:cNvSpPr>
+            <a:spLocks noGrp="1"/>
+          </p:cNvSpPr>
+          <p:nvPr>
+            <p:ph type="title"/>
+          </p:nvPr>
+        </p:nvSpPr>
+        <p:spPr/>
+        <p:txBody>
+          <a:bodyPr/>
+          <a:lstStyle/>
+          <a:p>
+            <a:r>
+              <a:rPr lang="de-DE" dirty="0"/>
+              <a:t>Grass</a:t>
+            </a:r>
+          </a:p>
+        </p:txBody>
+      </p:sp>
+    </p:spTree>
+    <p:extLst>
+      <p:ext uri="{BB962C8B-B14F-4D97-AF65-F5344CB8AC3E}">
+        <p14:creationId xmlns:p14="http://schemas.microsoft.com/office/powerpoint/2010/main" val="1854650698"/>
       </p:ext>
     </p:extLst>
   </p:cSld>

</xml_diff>